<commit_message>
work on powerpoint added
</commit_message>
<xml_diff>
--- a/Carolina Brew.pptx
+++ b/Carolina Brew.pptx
@@ -8,9 +8,9 @@
     <p:sldId id="256" r:id="rId2"/>
     <p:sldId id="257" r:id="rId3"/>
     <p:sldId id="258" r:id="rId4"/>
-    <p:sldId id="259" r:id="rId5"/>
-    <p:sldId id="260" r:id="rId6"/>
-    <p:sldId id="261" r:id="rId7"/>
+    <p:sldId id="260" r:id="rId5"/>
+    <p:sldId id="261" r:id="rId6"/>
+    <p:sldId id="263" r:id="rId7"/>
     <p:sldId id="262" r:id="rId8"/>
   </p:sldIdLst>
   <p:sldSz cx="12192000" cy="6858000"/>
@@ -110,6 +110,11 @@
       </a:defRPr>
     </a:lvl9pPr>
   </p:defaultTextStyle>
+  <p:extLst>
+    <p:ext uri="{EFAFB233-063F-42B5-8137-9DF3F51BA10A}">
+      <p15:sldGuideLst xmlns:p15="http://schemas.microsoft.com/office/powerpoint/2012/main"/>
+    </p:ext>
+  </p:extLst>
 </p:presentation>
 </file>
 
@@ -835,7 +840,7 @@
           <a:p>
             <a:fld id="{279B7C1F-9F85-4760-8617-72BCFC597A93}" type="datetimeFigureOut">
               <a:rPr lang="en-US" smtClean="0"/>
-              <a:t>3/20/2021</a:t>
+              <a:t>3/21/2021</a:t>
             </a:fld>
             <a:endParaRPr lang="en-US"/>
           </a:p>
@@ -1086,7 +1091,7 @@
           <a:p>
             <a:fld id="{279B7C1F-9F85-4760-8617-72BCFC597A93}" type="datetimeFigureOut">
               <a:rPr lang="en-US" smtClean="0"/>
-              <a:t>3/20/2021</a:t>
+              <a:t>3/21/2021</a:t>
             </a:fld>
             <a:endParaRPr lang="en-US"/>
           </a:p>
@@ -1400,7 +1405,7 @@
           <a:p>
             <a:fld id="{279B7C1F-9F85-4760-8617-72BCFC597A93}" type="datetimeFigureOut">
               <a:rPr lang="en-US" smtClean="0"/>
-              <a:t>3/20/2021</a:t>
+              <a:t>3/21/2021</a:t>
             </a:fld>
             <a:endParaRPr lang="en-US"/>
           </a:p>
@@ -1741,7 +1746,7 @@
           <a:p>
             <a:fld id="{279B7C1F-9F85-4760-8617-72BCFC597A93}" type="datetimeFigureOut">
               <a:rPr lang="en-US" smtClean="0"/>
-              <a:t>3/20/2021</a:t>
+              <a:t>3/21/2021</a:t>
             </a:fld>
             <a:endParaRPr lang="en-US"/>
           </a:p>
@@ -2055,7 +2060,7 @@
           <a:p>
             <a:fld id="{279B7C1F-9F85-4760-8617-72BCFC597A93}" type="datetimeFigureOut">
               <a:rPr lang="en-US" smtClean="0"/>
-              <a:t>3/20/2021</a:t>
+              <a:t>3/21/2021</a:t>
             </a:fld>
             <a:endParaRPr lang="en-US"/>
           </a:p>
@@ -2448,7 +2453,7 @@
           <a:p>
             <a:fld id="{279B7C1F-9F85-4760-8617-72BCFC597A93}" type="datetimeFigureOut">
               <a:rPr lang="en-US" smtClean="0"/>
-              <a:t>3/20/2021</a:t>
+              <a:t>3/21/2021</a:t>
             </a:fld>
             <a:endParaRPr lang="en-US"/>
           </a:p>
@@ -2618,7 +2623,7 @@
           <a:p>
             <a:fld id="{279B7C1F-9F85-4760-8617-72BCFC597A93}" type="datetimeFigureOut">
               <a:rPr lang="en-US" smtClean="0"/>
-              <a:t>3/20/2021</a:t>
+              <a:t>3/21/2021</a:t>
             </a:fld>
             <a:endParaRPr lang="en-US"/>
           </a:p>
@@ -2798,7 +2803,7 @@
           <a:p>
             <a:fld id="{279B7C1F-9F85-4760-8617-72BCFC597A93}" type="datetimeFigureOut">
               <a:rPr lang="en-US" smtClean="0"/>
-              <a:t>3/20/2021</a:t>
+              <a:t>3/21/2021</a:t>
             </a:fld>
             <a:endParaRPr lang="en-US"/>
           </a:p>
@@ -2974,7 +2979,7 @@
           <a:p>
             <a:fld id="{279B7C1F-9F85-4760-8617-72BCFC597A93}" type="datetimeFigureOut">
               <a:rPr lang="en-US" smtClean="0"/>
-              <a:t>3/20/2021</a:t>
+              <a:t>3/21/2021</a:t>
             </a:fld>
             <a:endParaRPr lang="en-US"/>
           </a:p>
@@ -3221,7 +3226,7 @@
           <a:p>
             <a:fld id="{279B7C1F-9F85-4760-8617-72BCFC597A93}" type="datetimeFigureOut">
               <a:rPr lang="en-US" smtClean="0"/>
-              <a:t>3/20/2021</a:t>
+              <a:t>3/21/2021</a:t>
             </a:fld>
             <a:endParaRPr lang="en-US"/>
           </a:p>
@@ -3453,7 +3458,7 @@
           <a:p>
             <a:fld id="{279B7C1F-9F85-4760-8617-72BCFC597A93}" type="datetimeFigureOut">
               <a:rPr lang="en-US" smtClean="0"/>
-              <a:t>3/20/2021</a:t>
+              <a:t>3/21/2021</a:t>
             </a:fld>
             <a:endParaRPr lang="en-US"/>
           </a:p>
@@ -3827,7 +3832,7 @@
           <a:p>
             <a:fld id="{279B7C1F-9F85-4760-8617-72BCFC597A93}" type="datetimeFigureOut">
               <a:rPr lang="en-US" smtClean="0"/>
-              <a:t>3/20/2021</a:t>
+              <a:t>3/21/2021</a:t>
             </a:fld>
             <a:endParaRPr lang="en-US"/>
           </a:p>
@@ -3950,7 +3955,7 @@
           <a:p>
             <a:fld id="{279B7C1F-9F85-4760-8617-72BCFC597A93}" type="datetimeFigureOut">
               <a:rPr lang="en-US" smtClean="0"/>
-              <a:t>3/20/2021</a:t>
+              <a:t>3/21/2021</a:t>
             </a:fld>
             <a:endParaRPr lang="en-US"/>
           </a:p>
@@ -4045,7 +4050,7 @@
           <a:p>
             <a:fld id="{279B7C1F-9F85-4760-8617-72BCFC597A93}" type="datetimeFigureOut">
               <a:rPr lang="en-US" smtClean="0"/>
-              <a:t>3/20/2021</a:t>
+              <a:t>3/21/2021</a:t>
             </a:fld>
             <a:endParaRPr lang="en-US"/>
           </a:p>
@@ -4300,7 +4305,7 @@
           <a:p>
             <a:fld id="{279B7C1F-9F85-4760-8617-72BCFC597A93}" type="datetimeFigureOut">
               <a:rPr lang="en-US" smtClean="0"/>
-              <a:t>3/20/2021</a:t>
+              <a:t>3/21/2021</a:t>
             </a:fld>
             <a:endParaRPr lang="en-US"/>
           </a:p>
@@ -4563,7 +4568,7 @@
           <a:p>
             <a:fld id="{279B7C1F-9F85-4760-8617-72BCFC597A93}" type="datetimeFigureOut">
               <a:rPr lang="en-US" smtClean="0"/>
-              <a:t>3/20/2021</a:t>
+              <a:t>3/21/2021</a:t>
             </a:fld>
             <a:endParaRPr lang="en-US"/>
           </a:p>
@@ -5306,7 +5311,7 @@
           <a:p>
             <a:fld id="{279B7C1F-9F85-4760-8617-72BCFC597A93}" type="datetimeFigureOut">
               <a:rPr lang="en-US" smtClean="0"/>
-              <a:t>3/20/2021</a:t>
+              <a:t>3/21/2021</a:t>
             </a:fld>
             <a:endParaRPr lang="en-US"/>
           </a:p>
@@ -5965,15 +5970,22 @@
             <p:ph type="title"/>
           </p:nvPr>
         </p:nvSpPr>
-        <p:spPr/>
-        <p:txBody>
-          <a:bodyPr/>
+        <p:spPr>
+          <a:xfrm>
+            <a:off x="677334" y="318656"/>
+            <a:ext cx="8596668" cy="660399"/>
+          </a:xfrm>
+        </p:spPr>
+        <p:txBody>
+          <a:bodyPr>
+            <a:normAutofit/>
+          </a:bodyPr>
           <a:lstStyle/>
           <a:p>
             <a:pPr algn="ctr"/>
             <a:r>
               <a:rPr lang="en-US" dirty="0"/>
-              <a:t>The Data</a:t>
+              <a:t>Extraction</a:t>
             </a:r>
           </a:p>
         </p:txBody>
@@ -5994,15 +6006,160 @@
             <p:ph idx="1"/>
           </p:nvPr>
         </p:nvSpPr>
-        <p:spPr/>
+        <p:spPr>
+          <a:xfrm>
+            <a:off x="677334" y="979055"/>
+            <a:ext cx="8596668" cy="5560290"/>
+          </a:xfrm>
+        </p:spPr>
         <p:txBody>
           <a:bodyPr/>
           <a:lstStyle/>
           <a:p>
-            <a:endParaRPr lang="en-US"/>
-          </a:p>
-        </p:txBody>
-      </p:sp>
+            <a:r>
+              <a:rPr lang="en-US" dirty="0"/>
+              <a:t>Data sets:</a:t>
+            </a:r>
+          </a:p>
+          <a:p>
+            <a:pPr lvl="1"/>
+            <a:r>
+              <a:rPr lang="en-US" b="0" i="0" dirty="0">
+                <a:solidFill>
+                  <a:srgbClr val="000000"/>
+                </a:solidFill>
+                <a:effectLst/>
+                <a:latin typeface="Helvetica Neue"/>
+              </a:rPr>
+              <a:t>KAGGLE - BREWERIES AND BEER PUBS IN THE US (.CSV)</a:t>
+            </a:r>
+          </a:p>
+          <a:p>
+            <a:pPr lvl="1"/>
+            <a:r>
+              <a:rPr lang="en-US" dirty="0"/>
+              <a:t>'https://api.yelp.com/v3/businesses/search’</a:t>
+            </a:r>
+            <a:r>
+              <a:rPr lang="en-US" dirty="0">
+                <a:solidFill>
+                  <a:srgbClr val="000000"/>
+                </a:solidFill>
+                <a:latin typeface="Helvetica Neue"/>
+              </a:rPr>
+              <a:t> (NC)</a:t>
+            </a:r>
+          </a:p>
+          <a:p>
+            <a:pPr lvl="1"/>
+            <a:r>
+              <a:rPr lang="en-US" dirty="0"/>
+              <a:t>'https://api.yelp.com/v3/businesses/search’</a:t>
+            </a:r>
+            <a:r>
+              <a:rPr lang="en-US" dirty="0">
+                <a:solidFill>
+                  <a:srgbClr val="000000"/>
+                </a:solidFill>
+                <a:latin typeface="Helvetica Neue"/>
+              </a:rPr>
+              <a:t> (SC)</a:t>
+            </a:r>
+          </a:p>
+          <a:p>
+            <a:pPr lvl="1"/>
+            <a:endParaRPr lang="en-US" dirty="0">
+              <a:solidFill>
+                <a:srgbClr val="000000"/>
+              </a:solidFill>
+              <a:latin typeface="Helvetica Neue"/>
+            </a:endParaRPr>
+          </a:p>
+          <a:p>
+            <a:pPr lvl="1"/>
+            <a:r>
+              <a:rPr lang="en-US" dirty="0">
+                <a:solidFill>
+                  <a:srgbClr val="000000"/>
+                </a:solidFill>
+                <a:latin typeface="Helvetica Neue"/>
+              </a:rPr>
+              <a:t>Initial Files:</a:t>
+            </a:r>
+          </a:p>
+          <a:p>
+            <a:pPr marL="457200" lvl="1" indent="0">
+              <a:buNone/>
+            </a:pPr>
+            <a:endParaRPr lang="en-US" dirty="0">
+              <a:solidFill>
+                <a:srgbClr val="000000"/>
+              </a:solidFill>
+              <a:latin typeface="Helvetica Neue"/>
+            </a:endParaRPr>
+          </a:p>
+        </p:txBody>
+      </p:sp>
+      <p:pic>
+        <p:nvPicPr>
+          <p:cNvPr id="5" name="Picture 4">
+            <a:extLst>
+              <a:ext uri="{FF2B5EF4-FFF2-40B4-BE49-F238E27FC236}">
+                <a16:creationId xmlns:a16="http://schemas.microsoft.com/office/drawing/2014/main" id="{AA6EA181-188B-49E5-BC7A-655ACBF6AA8D}"/>
+              </a:ext>
+            </a:extLst>
+          </p:cNvPr>
+          <p:cNvPicPr>
+            <a:picLocks noChangeAspect="1"/>
+          </p:cNvPicPr>
+          <p:nvPr/>
+        </p:nvPicPr>
+        <p:blipFill>
+          <a:blip r:embed="rId2"/>
+          <a:stretch>
+            <a:fillRect/>
+          </a:stretch>
+        </p:blipFill>
+        <p:spPr>
+          <a:xfrm>
+            <a:off x="2271730" y="3157550"/>
+            <a:ext cx="7458348" cy="1774728"/>
+          </a:xfrm>
+          <a:prstGeom prst="rect">
+            <a:avLst/>
+          </a:prstGeom>
+        </p:spPr>
+      </p:pic>
+      <p:pic>
+        <p:nvPicPr>
+          <p:cNvPr id="7" name="Picture 6">
+            <a:extLst>
+              <a:ext uri="{FF2B5EF4-FFF2-40B4-BE49-F238E27FC236}">
+                <a16:creationId xmlns:a16="http://schemas.microsoft.com/office/drawing/2014/main" id="{DE0A0F8D-8FEB-4A6A-A895-3FEEA3A982EB}"/>
+              </a:ext>
+            </a:extLst>
+          </p:cNvPr>
+          <p:cNvPicPr>
+            <a:picLocks noChangeAspect="1"/>
+          </p:cNvPicPr>
+          <p:nvPr/>
+        </p:nvPicPr>
+        <p:blipFill>
+          <a:blip r:embed="rId3"/>
+          <a:stretch>
+            <a:fillRect/>
+          </a:stretch>
+        </p:blipFill>
+        <p:spPr>
+          <a:xfrm>
+            <a:off x="903149" y="4579485"/>
+            <a:ext cx="5950234" cy="1940823"/>
+          </a:xfrm>
+          <a:prstGeom prst="rect">
+            <a:avLst/>
+          </a:prstGeom>
+        </p:spPr>
+      </p:pic>
     </p:spTree>
     <p:extLst>
       <p:ext uri="{BB962C8B-B14F-4D97-AF65-F5344CB8AC3E}">
@@ -6049,7 +6206,12 @@
             <p:ph type="title"/>
           </p:nvPr>
         </p:nvSpPr>
-        <p:spPr/>
+        <p:spPr>
+          <a:xfrm>
+            <a:off x="677334" y="369456"/>
+            <a:ext cx="8596668" cy="729672"/>
+          </a:xfrm>
+        </p:spPr>
         <p:txBody>
           <a:bodyPr/>
           <a:lstStyle/>
@@ -6057,7 +6219,7 @@
             <a:pPr algn="ctr"/>
             <a:r>
               <a:rPr lang="en-US" dirty="0"/>
-              <a:t>Data Cleanup &amp; Analysis</a:t>
+              <a:t>Transform</a:t>
             </a:r>
           </a:p>
         </p:txBody>
@@ -6078,15 +6240,133 @@
             <p:ph idx="1"/>
           </p:nvPr>
         </p:nvSpPr>
-        <p:spPr/>
+        <p:spPr>
+          <a:xfrm>
+            <a:off x="677334" y="1099128"/>
+            <a:ext cx="8596668" cy="5389416"/>
+          </a:xfrm>
+        </p:spPr>
         <p:txBody>
           <a:bodyPr/>
           <a:lstStyle/>
           <a:p>
-            <a:endParaRPr lang="en-US"/>
-          </a:p>
-        </p:txBody>
-      </p:sp>
+            <a:r>
+              <a:rPr lang="en-US" dirty="0"/>
+              <a:t>Kaggle file: remove columns, renamed columns, reorganized columns, 		removed rows with Nan and finally, sorted to North and South Carolina</a:t>
+            </a:r>
+          </a:p>
+          <a:p>
+            <a:r>
+              <a:rPr lang="en-US" dirty="0"/>
+              <a:t>Final Result:  77 Bars</a:t>
+            </a:r>
+          </a:p>
+          <a:p>
+            <a:endParaRPr lang="en-US" dirty="0"/>
+          </a:p>
+          <a:p>
+            <a:endParaRPr lang="en-US" dirty="0"/>
+          </a:p>
+          <a:p>
+            <a:endParaRPr lang="en-US" dirty="0"/>
+          </a:p>
+          <a:p>
+            <a:endParaRPr lang="en-US" dirty="0"/>
+          </a:p>
+          <a:p>
+            <a:r>
+              <a:rPr lang="en-US" dirty="0"/>
+              <a:t>Yelp file: created a list of rows of interest—address, bar id, price, rating, and number of reviews. Then placed into a pandas </a:t>
+            </a:r>
+            <a:r>
+              <a:rPr lang="en-US" dirty="0" err="1"/>
+              <a:t>DataFrame</a:t>
+            </a:r>
+            <a:r>
+              <a:rPr lang="en-US" dirty="0"/>
+              <a:t>.</a:t>
+            </a:r>
+          </a:p>
+          <a:p>
+            <a:r>
+              <a:rPr lang="en-US" dirty="0"/>
+              <a:t> Final Result : 20 Bars NC &amp; 20 Bars SC</a:t>
+            </a:r>
+          </a:p>
+          <a:p>
+            <a:pPr marL="1828800" lvl="4" indent="0">
+              <a:buNone/>
+            </a:pPr>
+            <a:endParaRPr lang="en-US" dirty="0"/>
+          </a:p>
+          <a:p>
+            <a:pPr marL="0" indent="0">
+              <a:buNone/>
+            </a:pPr>
+            <a:endParaRPr lang="en-US" dirty="0"/>
+          </a:p>
+        </p:txBody>
+      </p:sp>
+      <p:pic>
+        <p:nvPicPr>
+          <p:cNvPr id="5" name="Picture 4">
+            <a:extLst>
+              <a:ext uri="{FF2B5EF4-FFF2-40B4-BE49-F238E27FC236}">
+                <a16:creationId xmlns:a16="http://schemas.microsoft.com/office/drawing/2014/main" id="{C9FCC9C3-0EEC-44B7-875D-1060714FA0C0}"/>
+              </a:ext>
+            </a:extLst>
+          </p:cNvPr>
+          <p:cNvPicPr>
+            <a:picLocks noChangeAspect="1"/>
+          </p:cNvPicPr>
+          <p:nvPr/>
+        </p:nvPicPr>
+        <p:blipFill>
+          <a:blip r:embed="rId2"/>
+          <a:stretch>
+            <a:fillRect/>
+          </a:stretch>
+        </p:blipFill>
+        <p:spPr>
+          <a:xfrm>
+            <a:off x="1400887" y="2129536"/>
+            <a:ext cx="7716097" cy="1659811"/>
+          </a:xfrm>
+          <a:prstGeom prst="rect">
+            <a:avLst/>
+          </a:prstGeom>
+        </p:spPr>
+      </p:pic>
+      <p:pic>
+        <p:nvPicPr>
+          <p:cNvPr id="7" name="Picture 6">
+            <a:extLst>
+              <a:ext uri="{FF2B5EF4-FFF2-40B4-BE49-F238E27FC236}">
+                <a16:creationId xmlns:a16="http://schemas.microsoft.com/office/drawing/2014/main" id="{2F7EC1D9-4C44-4DAA-B168-104F5713D734}"/>
+              </a:ext>
+            </a:extLst>
+          </p:cNvPr>
+          <p:cNvPicPr>
+            <a:picLocks noChangeAspect="1"/>
+          </p:cNvPicPr>
+          <p:nvPr/>
+        </p:nvPicPr>
+        <p:blipFill>
+          <a:blip r:embed="rId3"/>
+          <a:stretch>
+            <a:fillRect/>
+          </a:stretch>
+        </p:blipFill>
+        <p:spPr>
+          <a:xfrm>
+            <a:off x="3763078" y="4819755"/>
+            <a:ext cx="4333333" cy="1638095"/>
+          </a:xfrm>
+          <a:prstGeom prst="rect">
+            <a:avLst/>
+          </a:prstGeom>
+        </p:spPr>
+      </p:pic>
     </p:spTree>
     <p:extLst>
       <p:ext uri="{BB962C8B-B14F-4D97-AF65-F5344CB8AC3E}">
@@ -6122,7 +6402,7 @@
           <p:cNvPr id="2" name="Title 1">
             <a:extLst>
               <a:ext uri="{FF2B5EF4-FFF2-40B4-BE49-F238E27FC236}">
-                <a16:creationId xmlns:a16="http://schemas.microsoft.com/office/drawing/2014/main" id="{3CB0ACFA-7D1D-4C97-A3A6-A7923D743CC1}"/>
+                <a16:creationId xmlns:a16="http://schemas.microsoft.com/office/drawing/2014/main" id="{1CF0F7C5-CDD6-480D-AED7-CC0900BCB145}"/>
               </a:ext>
             </a:extLst>
           </p:cNvPr>
@@ -6133,7 +6413,12 @@
             <p:ph type="title"/>
           </p:nvPr>
         </p:nvSpPr>
-        <p:spPr/>
+        <p:spPr>
+          <a:xfrm>
+            <a:off x="677334" y="360218"/>
+            <a:ext cx="8596668" cy="812800"/>
+          </a:xfrm>
+        </p:spPr>
         <p:txBody>
           <a:bodyPr/>
           <a:lstStyle/>
@@ -6141,7 +6426,7 @@
             <a:pPr algn="ctr"/>
             <a:r>
               <a:rPr lang="en-US" dirty="0"/>
-              <a:t>Extract</a:t>
+              <a:t>Transform</a:t>
             </a:r>
           </a:p>
         </p:txBody>
@@ -6151,7 +6436,7 @@
           <p:cNvPr id="3" name="Content Placeholder 2">
             <a:extLst>
               <a:ext uri="{FF2B5EF4-FFF2-40B4-BE49-F238E27FC236}">
-                <a16:creationId xmlns:a16="http://schemas.microsoft.com/office/drawing/2014/main" id="{35D1084D-CD0F-4F44-822C-D026161A5AE6}"/>
+                <a16:creationId xmlns:a16="http://schemas.microsoft.com/office/drawing/2014/main" id="{33664D00-DA9A-4DBE-B4C6-F12F73E5FD73}"/>
               </a:ext>
             </a:extLst>
           </p:cNvPr>
@@ -6162,19 +6447,74 @@
             <p:ph idx="1"/>
           </p:nvPr>
         </p:nvSpPr>
-        <p:spPr/>
+        <p:spPr>
+          <a:xfrm>
+            <a:off x="677334" y="1034473"/>
+            <a:ext cx="8596668" cy="5006889"/>
+          </a:xfrm>
+        </p:spPr>
         <p:txBody>
           <a:bodyPr/>
           <a:lstStyle/>
           <a:p>
-            <a:endParaRPr lang="en-US"/>
-          </a:p>
-        </p:txBody>
-      </p:sp>
+            <a:r>
+              <a:rPr lang="en-US" dirty="0"/>
+              <a:t>Sent tables to </a:t>
+            </a:r>
+            <a:r>
+              <a:rPr lang="en-US" dirty="0" err="1"/>
+              <a:t>postgres</a:t>
+            </a:r>
+            <a:r>
+              <a:rPr lang="en-US" dirty="0"/>
+              <a:t> – pgAdmin4</a:t>
+            </a:r>
+          </a:p>
+          <a:p>
+            <a:r>
+              <a:rPr lang="en-US" dirty="0"/>
+              <a:t>Confirmed all tables loaded </a:t>
+            </a:r>
+          </a:p>
+          <a:p>
+            <a:endParaRPr lang="en-US" dirty="0"/>
+          </a:p>
+        </p:txBody>
+      </p:sp>
+      <p:pic>
+        <p:nvPicPr>
+          <p:cNvPr id="5" name="Picture 4">
+            <a:extLst>
+              <a:ext uri="{FF2B5EF4-FFF2-40B4-BE49-F238E27FC236}">
+                <a16:creationId xmlns:a16="http://schemas.microsoft.com/office/drawing/2014/main" id="{B0E526D5-7C22-446B-A153-CA829538E040}"/>
+              </a:ext>
+            </a:extLst>
+          </p:cNvPr>
+          <p:cNvPicPr>
+            <a:picLocks noChangeAspect="1"/>
+          </p:cNvPicPr>
+          <p:nvPr/>
+        </p:nvPicPr>
+        <p:blipFill>
+          <a:blip r:embed="rId2"/>
+          <a:stretch>
+            <a:fillRect/>
+          </a:stretch>
+        </p:blipFill>
+        <p:spPr>
+          <a:xfrm>
+            <a:off x="4542297" y="1423366"/>
+            <a:ext cx="3844322" cy="4747156"/>
+          </a:xfrm>
+          <a:prstGeom prst="rect">
+            <a:avLst/>
+          </a:prstGeom>
+        </p:spPr>
+      </p:pic>
     </p:spTree>
     <p:extLst>
       <p:ext uri="{BB962C8B-B14F-4D97-AF65-F5344CB8AC3E}">
-        <p14:creationId xmlns:p14="http://schemas.microsoft.com/office/powerpoint/2010/main" val="599757374"/>
+        <p14:creationId xmlns:p14="http://schemas.microsoft.com/office/powerpoint/2010/main" val="3780265764"/>
       </p:ext>
     </p:extLst>
   </p:cSld>
@@ -6206,7 +6546,7 @@
           <p:cNvPr id="2" name="Title 1">
             <a:extLst>
               <a:ext uri="{FF2B5EF4-FFF2-40B4-BE49-F238E27FC236}">
-                <a16:creationId xmlns:a16="http://schemas.microsoft.com/office/drawing/2014/main" id="{1CF0F7C5-CDD6-480D-AED7-CC0900BCB145}"/>
+                <a16:creationId xmlns:a16="http://schemas.microsoft.com/office/drawing/2014/main" id="{1AE1659A-456E-43F8-8716-EE1AFA78CDE2}"/>
               </a:ext>
             </a:extLst>
           </p:cNvPr>
@@ -6217,7 +6557,12 @@
             <p:ph type="title"/>
           </p:nvPr>
         </p:nvSpPr>
-        <p:spPr/>
+        <p:spPr>
+          <a:xfrm>
+            <a:off x="677334" y="304800"/>
+            <a:ext cx="8596668" cy="757382"/>
+          </a:xfrm>
+        </p:spPr>
         <p:txBody>
           <a:bodyPr/>
           <a:lstStyle/>
@@ -6235,7 +6580,7 @@
           <p:cNvPr id="3" name="Content Placeholder 2">
             <a:extLst>
               <a:ext uri="{FF2B5EF4-FFF2-40B4-BE49-F238E27FC236}">
-                <a16:creationId xmlns:a16="http://schemas.microsoft.com/office/drawing/2014/main" id="{33664D00-DA9A-4DBE-B4C6-F12F73E5FD73}"/>
+                <a16:creationId xmlns:a16="http://schemas.microsoft.com/office/drawing/2014/main" id="{4FC0D2C8-710F-4856-854C-896876A83B37}"/>
               </a:ext>
             </a:extLst>
           </p:cNvPr>
@@ -6246,19 +6591,28 @@
             <p:ph idx="1"/>
           </p:nvPr>
         </p:nvSpPr>
-        <p:spPr/>
+        <p:spPr>
+          <a:xfrm>
+            <a:off x="677334" y="942109"/>
+            <a:ext cx="8596668" cy="5099253"/>
+          </a:xfrm>
+        </p:spPr>
         <p:txBody>
           <a:bodyPr/>
           <a:lstStyle/>
           <a:p>
-            <a:endParaRPr lang="en-US"/>
+            <a:r>
+              <a:rPr lang="en-US"/>
+              <a:t>Added </a:t>
+            </a:r>
+            <a:endParaRPr lang="en-US" dirty="0"/>
           </a:p>
         </p:txBody>
       </p:sp>
     </p:spTree>
     <p:extLst>
       <p:ext uri="{BB962C8B-B14F-4D97-AF65-F5344CB8AC3E}">
-        <p14:creationId xmlns:p14="http://schemas.microsoft.com/office/powerpoint/2010/main" val="3780265764"/>
+        <p14:creationId xmlns:p14="http://schemas.microsoft.com/office/powerpoint/2010/main" val="2357786455"/>
       </p:ext>
     </p:extLst>
   </p:cSld>
@@ -6342,7 +6696,7 @@
     </p:spTree>
     <p:extLst>
       <p:ext uri="{BB962C8B-B14F-4D97-AF65-F5344CB8AC3E}">
-        <p14:creationId xmlns:p14="http://schemas.microsoft.com/office/powerpoint/2010/main" val="2357786455"/>
+        <p14:creationId xmlns:p14="http://schemas.microsoft.com/office/powerpoint/2010/main" val="348694189"/>
       </p:ext>
     </p:extLst>
   </p:cSld>

</xml_diff>

<commit_message>
updated papers and ppx
</commit_message>
<xml_diff>
--- a/Carolina Brew.pptx
+++ b/Carolina Brew.pptx
@@ -841,7 +841,7 @@
           <a:p>
             <a:fld id="{279B7C1F-9F85-4760-8617-72BCFC597A93}" type="datetimeFigureOut">
               <a:rPr lang="en-US" smtClean="0"/>
-              <a:t>3/21/2021</a:t>
+              <a:t>3/22/2021</a:t>
             </a:fld>
             <a:endParaRPr lang="en-US"/>
           </a:p>
@@ -1092,7 +1092,7 @@
           <a:p>
             <a:fld id="{279B7C1F-9F85-4760-8617-72BCFC597A93}" type="datetimeFigureOut">
               <a:rPr lang="en-US" smtClean="0"/>
-              <a:t>3/21/2021</a:t>
+              <a:t>3/22/2021</a:t>
             </a:fld>
             <a:endParaRPr lang="en-US"/>
           </a:p>
@@ -1406,7 +1406,7 @@
           <a:p>
             <a:fld id="{279B7C1F-9F85-4760-8617-72BCFC597A93}" type="datetimeFigureOut">
               <a:rPr lang="en-US" smtClean="0"/>
-              <a:t>3/21/2021</a:t>
+              <a:t>3/22/2021</a:t>
             </a:fld>
             <a:endParaRPr lang="en-US"/>
           </a:p>
@@ -1747,7 +1747,7 @@
           <a:p>
             <a:fld id="{279B7C1F-9F85-4760-8617-72BCFC597A93}" type="datetimeFigureOut">
               <a:rPr lang="en-US" smtClean="0"/>
-              <a:t>3/21/2021</a:t>
+              <a:t>3/22/2021</a:t>
             </a:fld>
             <a:endParaRPr lang="en-US"/>
           </a:p>
@@ -2061,7 +2061,7 @@
           <a:p>
             <a:fld id="{279B7C1F-9F85-4760-8617-72BCFC597A93}" type="datetimeFigureOut">
               <a:rPr lang="en-US" smtClean="0"/>
-              <a:t>3/21/2021</a:t>
+              <a:t>3/22/2021</a:t>
             </a:fld>
             <a:endParaRPr lang="en-US"/>
           </a:p>
@@ -2454,7 +2454,7 @@
           <a:p>
             <a:fld id="{279B7C1F-9F85-4760-8617-72BCFC597A93}" type="datetimeFigureOut">
               <a:rPr lang="en-US" smtClean="0"/>
-              <a:t>3/21/2021</a:t>
+              <a:t>3/22/2021</a:t>
             </a:fld>
             <a:endParaRPr lang="en-US"/>
           </a:p>
@@ -2624,7 +2624,7 @@
           <a:p>
             <a:fld id="{279B7C1F-9F85-4760-8617-72BCFC597A93}" type="datetimeFigureOut">
               <a:rPr lang="en-US" smtClean="0"/>
-              <a:t>3/21/2021</a:t>
+              <a:t>3/22/2021</a:t>
             </a:fld>
             <a:endParaRPr lang="en-US"/>
           </a:p>
@@ -2804,7 +2804,7 @@
           <a:p>
             <a:fld id="{279B7C1F-9F85-4760-8617-72BCFC597A93}" type="datetimeFigureOut">
               <a:rPr lang="en-US" smtClean="0"/>
-              <a:t>3/21/2021</a:t>
+              <a:t>3/22/2021</a:t>
             </a:fld>
             <a:endParaRPr lang="en-US"/>
           </a:p>
@@ -2980,7 +2980,7 @@
           <a:p>
             <a:fld id="{279B7C1F-9F85-4760-8617-72BCFC597A93}" type="datetimeFigureOut">
               <a:rPr lang="en-US" smtClean="0"/>
-              <a:t>3/21/2021</a:t>
+              <a:t>3/22/2021</a:t>
             </a:fld>
             <a:endParaRPr lang="en-US"/>
           </a:p>
@@ -3227,7 +3227,7 @@
           <a:p>
             <a:fld id="{279B7C1F-9F85-4760-8617-72BCFC597A93}" type="datetimeFigureOut">
               <a:rPr lang="en-US" smtClean="0"/>
-              <a:t>3/21/2021</a:t>
+              <a:t>3/22/2021</a:t>
             </a:fld>
             <a:endParaRPr lang="en-US"/>
           </a:p>
@@ -3459,7 +3459,7 @@
           <a:p>
             <a:fld id="{279B7C1F-9F85-4760-8617-72BCFC597A93}" type="datetimeFigureOut">
               <a:rPr lang="en-US" smtClean="0"/>
-              <a:t>3/21/2021</a:t>
+              <a:t>3/22/2021</a:t>
             </a:fld>
             <a:endParaRPr lang="en-US"/>
           </a:p>
@@ -3833,7 +3833,7 @@
           <a:p>
             <a:fld id="{279B7C1F-9F85-4760-8617-72BCFC597A93}" type="datetimeFigureOut">
               <a:rPr lang="en-US" smtClean="0"/>
-              <a:t>3/21/2021</a:t>
+              <a:t>3/22/2021</a:t>
             </a:fld>
             <a:endParaRPr lang="en-US"/>
           </a:p>
@@ -3956,7 +3956,7 @@
           <a:p>
             <a:fld id="{279B7C1F-9F85-4760-8617-72BCFC597A93}" type="datetimeFigureOut">
               <a:rPr lang="en-US" smtClean="0"/>
-              <a:t>3/21/2021</a:t>
+              <a:t>3/22/2021</a:t>
             </a:fld>
             <a:endParaRPr lang="en-US"/>
           </a:p>
@@ -4051,7 +4051,7 @@
           <a:p>
             <a:fld id="{279B7C1F-9F85-4760-8617-72BCFC597A93}" type="datetimeFigureOut">
               <a:rPr lang="en-US" smtClean="0"/>
-              <a:t>3/21/2021</a:t>
+              <a:t>3/22/2021</a:t>
             </a:fld>
             <a:endParaRPr lang="en-US"/>
           </a:p>
@@ -4306,7 +4306,7 @@
           <a:p>
             <a:fld id="{279B7C1F-9F85-4760-8617-72BCFC597A93}" type="datetimeFigureOut">
               <a:rPr lang="en-US" smtClean="0"/>
-              <a:t>3/21/2021</a:t>
+              <a:t>3/22/2021</a:t>
             </a:fld>
             <a:endParaRPr lang="en-US"/>
           </a:p>
@@ -4569,7 +4569,7 @@
           <a:p>
             <a:fld id="{279B7C1F-9F85-4760-8617-72BCFC597A93}" type="datetimeFigureOut">
               <a:rPr lang="en-US" smtClean="0"/>
-              <a:t>3/21/2021</a:t>
+              <a:t>3/22/2021</a:t>
             </a:fld>
             <a:endParaRPr lang="en-US"/>
           </a:p>
@@ -5312,7 +5312,7 @@
           <a:p>
             <a:fld id="{279B7C1F-9F85-4760-8617-72BCFC597A93}" type="datetimeFigureOut">
               <a:rPr lang="en-US" smtClean="0"/>
-              <a:t>3/21/2021</a:t>
+              <a:t>3/22/2021</a:t>
             </a:fld>
             <a:endParaRPr lang="en-US"/>
           </a:p>
@@ -7276,10 +7276,10 @@
       </p:pic>
       <p:pic>
         <p:nvPicPr>
-          <p:cNvPr id="7" name="Picture 6">
+          <p:cNvPr id="6" name="Picture 5">
             <a:extLst>
               <a:ext uri="{FF2B5EF4-FFF2-40B4-BE49-F238E27FC236}">
-                <a16:creationId xmlns:a16="http://schemas.microsoft.com/office/drawing/2014/main" id="{2F7EC1D9-4C44-4DAA-B168-104F5713D734}"/>
+                <a16:creationId xmlns:a16="http://schemas.microsoft.com/office/drawing/2014/main" id="{6FD40C40-F8F4-45CF-844E-F5C31E3543F2}"/>
               </a:ext>
             </a:extLst>
           </p:cNvPr>
@@ -7296,8 +7296,8 @@
         </p:blipFill>
         <p:spPr>
           <a:xfrm>
-            <a:off x="3763078" y="4819755"/>
-            <a:ext cx="4333333" cy="1638095"/>
+            <a:off x="1064065" y="4912119"/>
+            <a:ext cx="7830553" cy="1306420"/>
           </a:xfrm>
           <a:prstGeom prst="rect">
             <a:avLst/>
@@ -7420,10 +7420,10 @@
       </p:sp>
       <p:pic>
         <p:nvPicPr>
-          <p:cNvPr id="5" name="Picture 4">
+          <p:cNvPr id="6" name="Picture 5">
             <a:extLst>
               <a:ext uri="{FF2B5EF4-FFF2-40B4-BE49-F238E27FC236}">
-                <a16:creationId xmlns:a16="http://schemas.microsoft.com/office/drawing/2014/main" id="{B0E526D5-7C22-446B-A153-CA829538E040}"/>
+                <a16:creationId xmlns:a16="http://schemas.microsoft.com/office/drawing/2014/main" id="{96972123-A2DC-4233-A1EC-3CA1B4958E6B}"/>
               </a:ext>
             </a:extLst>
           </p:cNvPr>
@@ -7440,8 +7440,8 @@
         </p:blipFill>
         <p:spPr>
           <a:xfrm>
-            <a:off x="4542297" y="1423366"/>
-            <a:ext cx="3844322" cy="4747156"/>
+            <a:off x="4101327" y="1444894"/>
+            <a:ext cx="4427624" cy="4808124"/>
           </a:xfrm>
           <a:prstGeom prst="rect">
             <a:avLst/>
@@ -7540,17 +7540,52 @@
           <a:p>
             <a:r>
               <a:rPr lang="en-US" dirty="0"/>
-              <a:t>Added Primary Key to tables</a:t>
+              <a:t>Altered </a:t>
+            </a:r>
+            <a:r>
+              <a:rPr lang="en-US" dirty="0" err="1"/>
+              <a:t>Breweries_data</a:t>
+            </a:r>
+            <a:r>
+              <a:rPr lang="en-US" dirty="0"/>
+              <a:t> by adding three columns</a:t>
             </a:r>
           </a:p>
           <a:p>
             <a:endParaRPr lang="en-US" dirty="0"/>
           </a:p>
           <a:p>
+            <a:endParaRPr lang="en-US" dirty="0"/>
+          </a:p>
+          <a:p>
+            <a:endParaRPr lang="en-US" dirty="0"/>
+          </a:p>
+          <a:p>
             <a:r>
               <a:rPr lang="en-US" dirty="0"/>
-              <a:t>Joined Tables</a:t>
-            </a:r>
+              <a:t>Confirmed tables were present in pgAdmin4</a:t>
+            </a:r>
+          </a:p>
+          <a:p>
+            <a:endParaRPr lang="en-US" dirty="0"/>
+          </a:p>
+          <a:p>
+            <a:endParaRPr lang="en-US" dirty="0"/>
+          </a:p>
+          <a:p>
+            <a:endParaRPr lang="en-US" dirty="0"/>
+          </a:p>
+          <a:p>
+            <a:endParaRPr lang="en-US" dirty="0"/>
+          </a:p>
+          <a:p>
+            <a:r>
+              <a:rPr lang="en-US" dirty="0"/>
+              <a:t>Merged tables to create one final table</a:t>
+            </a:r>
+          </a:p>
+          <a:p>
+            <a:endParaRPr lang="en-US" dirty="0"/>
           </a:p>
           <a:p>
             <a:pPr marL="0" indent="0">
@@ -7577,10 +7612,10 @@
       </p:sp>
       <p:pic>
         <p:nvPicPr>
-          <p:cNvPr id="5" name="Picture 4">
+          <p:cNvPr id="7" name="Picture 6">
             <a:extLst>
               <a:ext uri="{FF2B5EF4-FFF2-40B4-BE49-F238E27FC236}">
-                <a16:creationId xmlns:a16="http://schemas.microsoft.com/office/drawing/2014/main" id="{89F05125-99B0-43B2-A1E6-8E0997D08168}"/>
+                <a16:creationId xmlns:a16="http://schemas.microsoft.com/office/drawing/2014/main" id="{17F7AF7A-4937-4074-90B6-93C977726D24}"/>
               </a:ext>
             </a:extLst>
           </p:cNvPr>
@@ -7597,8 +7632,8 @@
         </p:blipFill>
         <p:spPr>
           <a:xfrm>
-            <a:off x="5176291" y="1051771"/>
-            <a:ext cx="2800000" cy="1666667"/>
+            <a:off x="928873" y="1360256"/>
+            <a:ext cx="3714286" cy="904762"/>
           </a:xfrm>
           <a:prstGeom prst="rect">
             <a:avLst/>
@@ -7607,10 +7642,10 @@
       </p:pic>
       <p:pic>
         <p:nvPicPr>
-          <p:cNvPr id="6" name="Picture 5" descr="Graphical user interface&#10;&#10;Description automatically generated">
+          <p:cNvPr id="9" name="Picture 8">
             <a:extLst>
               <a:ext uri="{FF2B5EF4-FFF2-40B4-BE49-F238E27FC236}">
-                <a16:creationId xmlns:a16="http://schemas.microsoft.com/office/drawing/2014/main" id="{69923303-3E54-4532-90C0-AC7AB447500E}"/>
+                <a16:creationId xmlns:a16="http://schemas.microsoft.com/office/drawing/2014/main" id="{B5083E8A-4F7E-4F59-BAC4-7B9E3B1D669F}"/>
               </a:ext>
             </a:extLst>
           </p:cNvPr>
@@ -7620,21 +7655,45 @@
           <p:nvPr/>
         </p:nvPicPr>
         <p:blipFill>
-          <a:blip r:embed="rId3">
-            <a:extLst>
-              <a:ext uri="{28A0092B-C50C-407E-A947-70E740481C1C}">
-                <a14:useLocalDpi xmlns:a14="http://schemas.microsoft.com/office/drawing/2010/main" val="0"/>
-              </a:ext>
-            </a:extLst>
-          </a:blip>
+          <a:blip r:embed="rId3"/>
           <a:stretch>
             <a:fillRect/>
           </a:stretch>
         </p:blipFill>
         <p:spPr>
           <a:xfrm>
-            <a:off x="891770" y="2303711"/>
-            <a:ext cx="3775364" cy="3737651"/>
+            <a:off x="1090493" y="2947010"/>
+            <a:ext cx="2714286" cy="1209524"/>
+          </a:xfrm>
+          <a:prstGeom prst="rect">
+            <a:avLst/>
+          </a:prstGeom>
+        </p:spPr>
+      </p:pic>
+      <p:pic>
+        <p:nvPicPr>
+          <p:cNvPr id="11" name="Picture 10">
+            <a:extLst>
+              <a:ext uri="{FF2B5EF4-FFF2-40B4-BE49-F238E27FC236}">
+                <a16:creationId xmlns:a16="http://schemas.microsoft.com/office/drawing/2014/main" id="{FC853445-C5BC-4D5A-A3FD-04508DF94FBA}"/>
+              </a:ext>
+            </a:extLst>
+          </p:cNvPr>
+          <p:cNvPicPr>
+            <a:picLocks noChangeAspect="1"/>
+          </p:cNvPicPr>
+          <p:nvPr/>
+        </p:nvPicPr>
+        <p:blipFill>
+          <a:blip r:embed="rId4"/>
+          <a:stretch>
+            <a:fillRect/>
+          </a:stretch>
+        </p:blipFill>
+        <p:spPr>
+          <a:xfrm>
+            <a:off x="5419106" y="3429000"/>
+            <a:ext cx="3238095" cy="2438095"/>
           </a:xfrm>
           <a:prstGeom prst="rect">
             <a:avLst/>
@@ -7687,7 +7746,12 @@
             <p:ph type="title"/>
           </p:nvPr>
         </p:nvSpPr>
-        <p:spPr/>
+        <p:spPr>
+          <a:xfrm>
+            <a:off x="677334" y="397164"/>
+            <a:ext cx="8596668" cy="683491"/>
+          </a:xfrm>
+        </p:spPr>
         <p:txBody>
           <a:bodyPr/>
           <a:lstStyle/>
@@ -7716,15 +7780,155 @@
             <p:ph idx="1"/>
           </p:nvPr>
         </p:nvSpPr>
-        <p:spPr/>
+        <p:spPr>
+          <a:xfrm>
+            <a:off x="677334" y="1080655"/>
+            <a:ext cx="8596668" cy="4960708"/>
+          </a:xfrm>
+        </p:spPr>
         <p:txBody>
           <a:bodyPr/>
           <a:lstStyle/>
           <a:p>
-            <a:endParaRPr lang="en-US"/>
-          </a:p>
-        </p:txBody>
-      </p:sp>
+            <a:pPr marL="0" indent="0">
+              <a:buNone/>
+            </a:pPr>
+            <a:r>
+              <a:rPr lang="en-US" dirty="0"/>
+              <a:t>	Confirmed data in merged tables (FINAL TABLE: Breweries)</a:t>
+            </a:r>
+          </a:p>
+          <a:p>
+            <a:pPr marL="0" indent="0">
+              <a:buNone/>
+            </a:pPr>
+            <a:endParaRPr lang="en-US" dirty="0"/>
+          </a:p>
+          <a:p>
+            <a:pPr marL="0" indent="0">
+              <a:buNone/>
+            </a:pPr>
+            <a:endParaRPr lang="en-US" dirty="0"/>
+          </a:p>
+          <a:p>
+            <a:pPr marL="0" indent="0">
+              <a:buNone/>
+            </a:pPr>
+            <a:endParaRPr lang="en-US" dirty="0"/>
+          </a:p>
+          <a:p>
+            <a:pPr marL="0" indent="0">
+              <a:buNone/>
+            </a:pPr>
+            <a:endParaRPr lang="en-US" dirty="0"/>
+          </a:p>
+          <a:p>
+            <a:pPr marL="0" indent="0">
+              <a:buNone/>
+            </a:pPr>
+            <a:endParaRPr lang="en-US" dirty="0"/>
+          </a:p>
+          <a:p>
+            <a:pPr marL="0" indent="0">
+              <a:buNone/>
+            </a:pPr>
+            <a:endParaRPr lang="en-US" dirty="0"/>
+          </a:p>
+          <a:p>
+            <a:pPr marL="0" indent="0">
+              <a:buNone/>
+            </a:pPr>
+            <a:endParaRPr lang="en-US" dirty="0"/>
+          </a:p>
+          <a:p>
+            <a:pPr marL="0" indent="0">
+              <a:buNone/>
+            </a:pPr>
+            <a:endParaRPr lang="en-US" dirty="0"/>
+          </a:p>
+          <a:p>
+            <a:pPr marL="0" indent="0">
+              <a:buNone/>
+            </a:pPr>
+            <a:endParaRPr lang="en-US" dirty="0"/>
+          </a:p>
+          <a:p>
+            <a:pPr marL="0" indent="0">
+              <a:buNone/>
+            </a:pPr>
+            <a:r>
+              <a:rPr lang="en-US" dirty="0"/>
+              <a:t>        Confirmed size of table – 117 Rows</a:t>
+            </a:r>
+          </a:p>
+          <a:p>
+            <a:pPr marL="0" indent="0">
+              <a:buNone/>
+            </a:pPr>
+            <a:endParaRPr lang="en-US" dirty="0"/>
+          </a:p>
+        </p:txBody>
+      </p:sp>
+      <p:pic>
+        <p:nvPicPr>
+          <p:cNvPr id="5" name="Picture 4">
+            <a:extLst>
+              <a:ext uri="{FF2B5EF4-FFF2-40B4-BE49-F238E27FC236}">
+                <a16:creationId xmlns:a16="http://schemas.microsoft.com/office/drawing/2014/main" id="{8528177D-4810-475A-A524-A6CAAAFA7B30}"/>
+              </a:ext>
+            </a:extLst>
+          </p:cNvPr>
+          <p:cNvPicPr>
+            <a:picLocks noChangeAspect="1"/>
+          </p:cNvPicPr>
+          <p:nvPr/>
+        </p:nvPicPr>
+        <p:blipFill>
+          <a:blip r:embed="rId2"/>
+          <a:stretch>
+            <a:fillRect/>
+          </a:stretch>
+        </p:blipFill>
+        <p:spPr>
+          <a:xfrm>
+            <a:off x="1484664" y="1722310"/>
+            <a:ext cx="2866667" cy="638095"/>
+          </a:xfrm>
+          <a:prstGeom prst="rect">
+            <a:avLst/>
+          </a:prstGeom>
+        </p:spPr>
+      </p:pic>
+      <p:pic>
+        <p:nvPicPr>
+          <p:cNvPr id="7" name="Picture 6">
+            <a:extLst>
+              <a:ext uri="{FF2B5EF4-FFF2-40B4-BE49-F238E27FC236}">
+                <a16:creationId xmlns:a16="http://schemas.microsoft.com/office/drawing/2014/main" id="{7243AC75-6333-474D-90F6-61BA5F59BBBA}"/>
+              </a:ext>
+            </a:extLst>
+          </p:cNvPr>
+          <p:cNvPicPr>
+            <a:picLocks noChangeAspect="1"/>
+          </p:cNvPicPr>
+          <p:nvPr/>
+        </p:nvPicPr>
+        <p:blipFill>
+          <a:blip r:embed="rId3"/>
+          <a:stretch>
+            <a:fillRect/>
+          </a:stretch>
+        </p:blipFill>
+        <p:spPr>
+          <a:xfrm>
+            <a:off x="931145" y="2620039"/>
+            <a:ext cx="8342857" cy="2066667"/>
+          </a:xfrm>
+          <a:prstGeom prst="rect">
+            <a:avLst/>
+          </a:prstGeom>
+        </p:spPr>
+      </p:pic>
     </p:spTree>
     <p:extLst>
       <p:ext uri="{BB962C8B-B14F-4D97-AF65-F5344CB8AC3E}">
@@ -7771,7 +7975,12 @@
             <p:ph type="title"/>
           </p:nvPr>
         </p:nvSpPr>
-        <p:spPr/>
+        <p:spPr>
+          <a:xfrm>
+            <a:off x="677334" y="336884"/>
+            <a:ext cx="8596668" cy="753979"/>
+          </a:xfrm>
+        </p:spPr>
         <p:txBody>
           <a:bodyPr/>
           <a:lstStyle/>
@@ -7800,15 +8009,56 @@
             <p:ph idx="1"/>
           </p:nvPr>
         </p:nvSpPr>
-        <p:spPr/>
+        <p:spPr>
+          <a:xfrm>
+            <a:off x="677334" y="1010653"/>
+            <a:ext cx="8596668" cy="5030709"/>
+          </a:xfrm>
+        </p:spPr>
         <p:txBody>
           <a:bodyPr/>
           <a:lstStyle/>
           <a:p>
+            <a:r>
+              <a:rPr lang="en-US" dirty="0"/>
+              <a:t>Road Trip:</a:t>
+            </a:r>
+          </a:p>
+          <a:p>
             <a:endParaRPr lang="en-US" dirty="0"/>
           </a:p>
         </p:txBody>
       </p:sp>
+      <p:pic>
+        <p:nvPicPr>
+          <p:cNvPr id="5" name="Picture 4">
+            <a:extLst>
+              <a:ext uri="{FF2B5EF4-FFF2-40B4-BE49-F238E27FC236}">
+                <a16:creationId xmlns:a16="http://schemas.microsoft.com/office/drawing/2014/main" id="{77E6FEE9-F3B0-4732-BD48-CA3CB735ABF7}"/>
+              </a:ext>
+            </a:extLst>
+          </p:cNvPr>
+          <p:cNvPicPr>
+            <a:picLocks noChangeAspect="1"/>
+          </p:cNvPicPr>
+          <p:nvPr/>
+        </p:nvPicPr>
+        <p:blipFill>
+          <a:blip r:embed="rId2"/>
+          <a:stretch>
+            <a:fillRect/>
+          </a:stretch>
+        </p:blipFill>
+        <p:spPr>
+          <a:xfrm>
+            <a:off x="1428921" y="1494399"/>
+            <a:ext cx="7336389" cy="1944324"/>
+          </a:xfrm>
+          <a:prstGeom prst="rect">
+            <a:avLst/>
+          </a:prstGeom>
+        </p:spPr>
+      </p:pic>
     </p:spTree>
     <p:extLst>
       <p:ext uri="{BB962C8B-B14F-4D97-AF65-F5344CB8AC3E}">

</xml_diff>